<commit_message>
updated example to include atm case
</commit_message>
<xml_diff>
--- a/Wi21_content/SEDS/L10.Software_Design.pptx
+++ b/Wi21_content/SEDS/L10.Software_Design.pptx
@@ -5,10 +5,10 @@
     <p:sldMasterId id="2147483648" r:id="rId1"/>
   </p:sldMasterIdLst>
   <p:notesMasterIdLst>
-    <p:notesMasterId r:id="rId18"/>
+    <p:notesMasterId r:id="rId20"/>
   </p:notesMasterIdLst>
   <p:handoutMasterIdLst>
-    <p:handoutMasterId r:id="rId19"/>
+    <p:handoutMasterId r:id="rId21"/>
   </p:handoutMasterIdLst>
   <p:sldIdLst>
     <p:sldId id="436" r:id="rId2"/>
@@ -24,9 +24,11 @@
     <p:sldId id="410" r:id="rId12"/>
     <p:sldId id="444" r:id="rId13"/>
     <p:sldId id="442" r:id="rId14"/>
-    <p:sldId id="440" r:id="rId15"/>
-    <p:sldId id="448" r:id="rId16"/>
-    <p:sldId id="452" r:id="rId17"/>
+    <p:sldId id="453" r:id="rId15"/>
+    <p:sldId id="440" r:id="rId16"/>
+    <p:sldId id="448" r:id="rId17"/>
+    <p:sldId id="454" r:id="rId18"/>
+    <p:sldId id="452" r:id="rId19"/>
   </p:sldIdLst>
   <p:sldSz cx="9144000" cy="6858000" type="screen4x3"/>
   <p:notesSz cx="6858000" cy="9144000"/>
@@ -272,7 +274,7 @@
               <a:pPr>
                 <a:defRPr/>
               </a:pPr>
-              <a:t>2/13/20</a:t>
+              <a:t>2/9/21</a:t>
             </a:fld>
             <a:endParaRPr lang="en-US" altLang="x-none"/>
           </a:p>
@@ -465,7 +467,7 @@
               <a:pPr>
                 <a:defRPr/>
               </a:pPr>
-              <a:t>2/13/20</a:t>
+              <a:t>2/9/21</a:t>
             </a:fld>
             <a:endParaRPr lang="en-US" altLang="x-none"/>
           </a:p>
@@ -821,7 +823,7 @@
               </a14:hiddenFill>
             </a:ext>
             <a:ext uri="{FAA26D3D-D897-4be2-8F04-BA451C77F1D7}">
-              <ma14:placeholderFlag xmlns="" xmlns:ma14="http://schemas.microsoft.com/office/mac/drawingml/2011/main" val="1"/>
+              <ma14:placeholderFlag xmlns:ma14="http://schemas.microsoft.com/office/mac/drawingml/2011/main" xmlns="" val="1"/>
             </a:ext>
           </a:extLst>
         </p:spPr>
@@ -1108,7 +1110,7 @@
               </a14:hiddenFill>
             </a:ext>
             <a:ext uri="{FAA26D3D-D897-4be2-8F04-BA451C77F1D7}">
-              <ma14:placeholderFlag xmlns="" xmlns:ma14="http://schemas.microsoft.com/office/mac/drawingml/2011/main" val="1"/>
+              <ma14:placeholderFlag xmlns:ma14="http://schemas.microsoft.com/office/mac/drawingml/2011/main" xmlns="" val="1"/>
             </a:ext>
           </a:extLst>
         </p:spPr>
@@ -1341,7 +1343,7 @@
                   <a:spcPct val="0"/>
                 </a:spcBef>
               </a:pPr>
-              <a:t>14</a:t>
+              <a:t>15</a:t>
             </a:fld>
             <a:endParaRPr lang="en-US" altLang="en-US">
               <a:latin typeface="Arial" charset="0"/>
@@ -7512,6 +7514,761 @@
       </p:grpSpPr>
       <p:sp>
         <p:nvSpPr>
+          <p:cNvPr id="33793" name="Title 1"/>
+          <p:cNvSpPr>
+            <a:spLocks noGrp="1"/>
+          </p:cNvSpPr>
+          <p:nvPr>
+            <p:ph type="title"/>
+          </p:nvPr>
+        </p:nvSpPr>
+        <p:spPr bwMode="auto">
+          <a:noFill/>
+          <a:extLst>
+            <a:ext uri="{909E8E84-426E-40DD-AFC4-6F175D3DCCD1}">
+              <a14:hiddenFill xmlns:a14="http://schemas.microsoft.com/office/drawing/2010/main">
+                <a:solidFill>
+                  <a:srgbClr val="FFFFFF"/>
+                </a:solidFill>
+              </a14:hiddenFill>
+            </a:ext>
+            <a:ext uri="{91240B29-F687-4F45-9708-019B960494DF}">
+              <a14:hiddenLine xmlns:a14="http://schemas.microsoft.com/office/drawing/2010/main" w="9525">
+                <a:solidFill>
+                  <a:srgbClr val="000000"/>
+                </a:solidFill>
+                <a:miter lim="800000"/>
+                <a:headEnd/>
+                <a:tailEnd/>
+              </a14:hiddenLine>
+            </a:ext>
+          </a:extLst>
+        </p:spPr>
+        <p:txBody>
+          <a:bodyPr vert="horz" wrap="square" lIns="91440" tIns="45720" rIns="91440" bIns="45720" numCol="1" anchor="t" anchorCtr="0" compatLnSpc="1">
+            <a:prstTxWarp prst="textNoShape">
+              <a:avLst/>
+            </a:prstTxWarp>
+          </a:bodyPr>
+          <a:lstStyle/>
+          <a:p>
+            <a:r>
+              <a:rPr lang="en-US" altLang="en-US" dirty="0">
+                <a:ea typeface="ＭＳ Ｐゴシック" charset="-128"/>
+              </a:rPr>
+              <a:t>Use case: </a:t>
+            </a:r>
+            <a:r>
+              <a:rPr lang="en-US" altLang="en-US" i="1" dirty="0">
+                <a:ea typeface="ＭＳ Ｐゴシック" charset="-128"/>
+              </a:rPr>
+              <a:t>Find Primes &lt; N</a:t>
+            </a:r>
+          </a:p>
+        </p:txBody>
+      </p:sp>
+      <p:sp>
+        <p:nvSpPr>
+          <p:cNvPr id="3" name="Content Placeholder 2"/>
+          <p:cNvSpPr>
+            <a:spLocks noGrp="1"/>
+          </p:cNvSpPr>
+          <p:nvPr>
+            <p:ph idx="1"/>
+          </p:nvPr>
+        </p:nvSpPr>
+        <p:spPr bwMode="auto">
+          <a:xfrm>
+            <a:off x="457200" y="1371600"/>
+            <a:ext cx="8229600" cy="4572000"/>
+          </a:xfrm>
+          <a:noFill/>
+          <a:extLst>
+            <a:ext uri="{909E8E84-426E-40DD-AFC4-6F175D3DCCD1}">
+              <a14:hiddenFill xmlns:a14="http://schemas.microsoft.com/office/drawing/2010/main">
+                <a:solidFill>
+                  <a:srgbClr val="FFFFFF"/>
+                </a:solidFill>
+              </a14:hiddenFill>
+            </a:ext>
+            <a:ext uri="{91240B29-F687-4F45-9708-019B960494DF}">
+              <a14:hiddenLine xmlns:a14="http://schemas.microsoft.com/office/drawing/2010/main" w="9525">
+                <a:solidFill>
+                  <a:srgbClr val="000000"/>
+                </a:solidFill>
+                <a:miter lim="800000"/>
+                <a:headEnd/>
+                <a:tailEnd/>
+              </a14:hiddenLine>
+            </a:ext>
+          </a:extLst>
+        </p:spPr>
+        <p:txBody>
+          <a:bodyPr vert="horz" wrap="square" lIns="91440" tIns="45720" rIns="91440" bIns="45720" numCol="1" anchor="t" anchorCtr="0" compatLnSpc="1">
+            <a:prstTxWarp prst="textNoShape">
+              <a:avLst/>
+            </a:prstTxWarp>
+          </a:bodyPr>
+          <a:lstStyle/>
+          <a:p>
+            <a:r>
+              <a:rPr lang="en-US" altLang="en-US" dirty="0">
+                <a:ea typeface="ＭＳ Ｐゴシック" charset="-128"/>
+              </a:rPr>
+              <a:t>Name</a:t>
+            </a:r>
+          </a:p>
+          <a:p>
+            <a:pPr lvl="1"/>
+            <a:r>
+              <a:rPr lang="en-US" altLang="en-US" dirty="0" err="1">
+                <a:latin typeface="Courier New" charset="0"/>
+                <a:ea typeface="ＭＳ Ｐゴシック" charset="-128"/>
+              </a:rPr>
+              <a:t>FindPrimes</a:t>
+            </a:r>
+            <a:endParaRPr lang="en-US" altLang="en-US" dirty="0">
+              <a:latin typeface="Courier New" charset="0"/>
+              <a:ea typeface="ＭＳ Ｐゴシック" charset="-128"/>
+            </a:endParaRPr>
+          </a:p>
+          <a:p>
+            <a:r>
+              <a:rPr lang="en-US" altLang="en-US" dirty="0">
+                <a:ea typeface="ＭＳ Ｐゴシック" charset="-128"/>
+              </a:rPr>
+              <a:t>What it does:</a:t>
+            </a:r>
+          </a:p>
+          <a:p>
+            <a:pPr lvl="1"/>
+            <a:r>
+              <a:rPr lang="en-US" altLang="en-US" dirty="0">
+                <a:ea typeface="ＭＳ Ｐゴシック" charset="-128"/>
+              </a:rPr>
+              <a:t>Finds the primes that are less than </a:t>
+            </a:r>
+            <a:r>
+              <a:rPr lang="en-US" altLang="en-US" i="1" dirty="0">
+                <a:ea typeface="ＭＳ Ｐゴシック" charset="-128"/>
+              </a:rPr>
+              <a:t>N</a:t>
+            </a:r>
+          </a:p>
+          <a:p>
+            <a:r>
+              <a:rPr lang="en-US" altLang="en-US" dirty="0">
+                <a:ea typeface="ＭＳ Ｐゴシック" charset="-128"/>
+              </a:rPr>
+              <a:t>Inputs (with type information)</a:t>
+            </a:r>
+          </a:p>
+          <a:p>
+            <a:pPr lvl="1"/>
+            <a:r>
+              <a:rPr lang="en-US" altLang="en-US" i="1" dirty="0">
+                <a:ea typeface="ＭＳ Ｐゴシック" charset="-128"/>
+              </a:rPr>
+              <a:t>N</a:t>
+            </a:r>
+            <a:r>
+              <a:rPr lang="en-US" altLang="en-US" dirty="0">
+                <a:ea typeface="ＭＳ Ｐゴシック" charset="-128"/>
+              </a:rPr>
+              <a:t>, an integer</a:t>
+            </a:r>
+          </a:p>
+          <a:p>
+            <a:r>
+              <a:rPr lang="en-US" altLang="en-US" dirty="0">
+                <a:ea typeface="ＭＳ Ｐゴシック" charset="-128"/>
+              </a:rPr>
+              <a:t>Outputs (with type information)</a:t>
+            </a:r>
+          </a:p>
+          <a:p>
+            <a:pPr lvl="1"/>
+            <a:r>
+              <a:rPr lang="en-US" altLang="en-US" dirty="0">
+                <a:ea typeface="ＭＳ Ｐゴシック" charset="-128"/>
+              </a:rPr>
+              <a:t>List of integers</a:t>
+            </a:r>
+          </a:p>
+          <a:p>
+            <a:endParaRPr lang="en-US" altLang="en-US" dirty="0">
+              <a:latin typeface="Arial" charset="0"/>
+              <a:ea typeface="ＭＳ Ｐゴシック" charset="-128"/>
+            </a:endParaRPr>
+          </a:p>
+          <a:p>
+            <a:endParaRPr lang="en-US" altLang="en-US" dirty="0">
+              <a:latin typeface="Courier New" charset="0"/>
+              <a:ea typeface="ＭＳ Ｐゴシック" charset="-128"/>
+            </a:endParaRPr>
+          </a:p>
+        </p:txBody>
+      </p:sp>
+      <p:sp>
+        <p:nvSpPr>
+          <p:cNvPr id="33795" name="Footer Placeholder 3"/>
+          <p:cNvSpPr>
+            <a:spLocks noGrp="1"/>
+          </p:cNvSpPr>
+          <p:nvPr>
+            <p:ph type="ftr" sz="quarter" idx="4294967295"/>
+          </p:nvPr>
+        </p:nvSpPr>
+        <p:spPr bwMode="auto">
+          <a:xfrm>
+            <a:off x="3124200" y="6307224"/>
+            <a:ext cx="2895600" cy="365125"/>
+          </a:xfrm>
+          <a:noFill/>
+          <a:extLst>
+            <a:ext uri="{909E8E84-426E-40DD-AFC4-6F175D3DCCD1}">
+              <a14:hiddenFill xmlns:a14="http://schemas.microsoft.com/office/drawing/2010/main">
+                <a:solidFill>
+                  <a:srgbClr val="FFFFFF"/>
+                </a:solidFill>
+              </a14:hiddenFill>
+            </a:ext>
+            <a:ext uri="{91240B29-F687-4F45-9708-019B960494DF}">
+              <a14:hiddenLine xmlns:a14="http://schemas.microsoft.com/office/drawing/2010/main" w="9525">
+                <a:solidFill>
+                  <a:srgbClr val="000000"/>
+                </a:solidFill>
+                <a:miter lim="800000"/>
+                <a:headEnd/>
+                <a:tailEnd/>
+              </a14:hiddenLine>
+            </a:ext>
+          </a:extLst>
+        </p:spPr>
+        <p:txBody>
+          <a:bodyPr/>
+          <a:lstStyle>
+            <a:lvl1pPr>
+              <a:defRPr>
+                <a:solidFill>
+                  <a:schemeClr val="tx1"/>
+                </a:solidFill>
+                <a:latin typeface="Arial" charset="0"/>
+                <a:ea typeface="ＭＳ Ｐゴシック" charset="-128"/>
+              </a:defRPr>
+            </a:lvl1pPr>
+            <a:lvl2pPr marL="742950" indent="-285750">
+              <a:defRPr>
+                <a:solidFill>
+                  <a:schemeClr val="tx1"/>
+                </a:solidFill>
+                <a:latin typeface="Arial" charset="0"/>
+                <a:ea typeface="ＭＳ Ｐゴシック" charset="-128"/>
+              </a:defRPr>
+            </a:lvl2pPr>
+            <a:lvl3pPr marL="1143000" indent="-228600">
+              <a:defRPr>
+                <a:solidFill>
+                  <a:schemeClr val="tx1"/>
+                </a:solidFill>
+                <a:latin typeface="Arial" charset="0"/>
+                <a:ea typeface="ＭＳ Ｐゴシック" charset="-128"/>
+              </a:defRPr>
+            </a:lvl3pPr>
+            <a:lvl4pPr marL="1600200" indent="-228600">
+              <a:defRPr>
+                <a:solidFill>
+                  <a:schemeClr val="tx1"/>
+                </a:solidFill>
+                <a:latin typeface="Arial" charset="0"/>
+                <a:ea typeface="ＭＳ Ｐゴシック" charset="-128"/>
+              </a:defRPr>
+            </a:lvl4pPr>
+            <a:lvl5pPr marL="2057400" indent="-228600">
+              <a:defRPr>
+                <a:solidFill>
+                  <a:schemeClr val="tx1"/>
+                </a:solidFill>
+                <a:latin typeface="Arial" charset="0"/>
+                <a:ea typeface="ＭＳ Ｐゴシック" charset="-128"/>
+              </a:defRPr>
+            </a:lvl5pPr>
+            <a:lvl6pPr marL="2514600" indent="-228600" defTabSz="457200" eaLnBrk="0" fontAlgn="base" hangingPunct="0">
+              <a:spcBef>
+                <a:spcPct val="0"/>
+              </a:spcBef>
+              <a:spcAft>
+                <a:spcPct val="0"/>
+              </a:spcAft>
+              <a:defRPr>
+                <a:solidFill>
+                  <a:schemeClr val="tx1"/>
+                </a:solidFill>
+                <a:latin typeface="Arial" charset="0"/>
+                <a:ea typeface="ＭＳ Ｐゴシック" charset="-128"/>
+              </a:defRPr>
+            </a:lvl6pPr>
+            <a:lvl7pPr marL="2971800" indent="-228600" defTabSz="457200" eaLnBrk="0" fontAlgn="base" hangingPunct="0">
+              <a:spcBef>
+                <a:spcPct val="0"/>
+              </a:spcBef>
+              <a:spcAft>
+                <a:spcPct val="0"/>
+              </a:spcAft>
+              <a:defRPr>
+                <a:solidFill>
+                  <a:schemeClr val="tx1"/>
+                </a:solidFill>
+                <a:latin typeface="Arial" charset="0"/>
+                <a:ea typeface="ＭＳ Ｐゴシック" charset="-128"/>
+              </a:defRPr>
+            </a:lvl7pPr>
+            <a:lvl8pPr marL="3429000" indent="-228600" defTabSz="457200" eaLnBrk="0" fontAlgn="base" hangingPunct="0">
+              <a:spcBef>
+                <a:spcPct val="0"/>
+              </a:spcBef>
+              <a:spcAft>
+                <a:spcPct val="0"/>
+              </a:spcAft>
+              <a:defRPr>
+                <a:solidFill>
+                  <a:schemeClr val="tx1"/>
+                </a:solidFill>
+                <a:latin typeface="Arial" charset="0"/>
+                <a:ea typeface="ＭＳ Ｐゴシック" charset="-128"/>
+              </a:defRPr>
+            </a:lvl8pPr>
+            <a:lvl9pPr marL="3886200" indent="-228600" defTabSz="457200" eaLnBrk="0" fontAlgn="base" hangingPunct="0">
+              <a:spcBef>
+                <a:spcPct val="0"/>
+              </a:spcBef>
+              <a:spcAft>
+                <a:spcPct val="0"/>
+              </a:spcAft>
+              <a:defRPr>
+                <a:solidFill>
+                  <a:schemeClr val="tx1"/>
+                </a:solidFill>
+                <a:latin typeface="Arial" charset="0"/>
+                <a:ea typeface="ＭＳ Ｐゴシック" charset="-128"/>
+              </a:defRPr>
+            </a:lvl9pPr>
+          </a:lstStyle>
+          <a:p>
+            <a:endParaRPr lang="en-US" altLang="en-US" dirty="0">
+              <a:solidFill>
+                <a:srgbClr val="898989"/>
+              </a:solidFill>
+              <a:latin typeface="Calibri" charset="0"/>
+            </a:endParaRPr>
+          </a:p>
+        </p:txBody>
+      </p:sp>
+    </p:spTree>
+    <p:extLst>
+      <p:ext uri="{BB962C8B-B14F-4D97-AF65-F5344CB8AC3E}">
+        <p14:creationId xmlns:p14="http://schemas.microsoft.com/office/powerpoint/2010/main" val="359924822"/>
+      </p:ext>
+    </p:extLst>
+  </p:cSld>
+  <p:clrMapOvr>
+    <a:masterClrMapping/>
+  </p:clrMapOvr>
+  <p:timing>
+    <p:tnLst>
+      <p:par>
+        <p:cTn id="1" dur="indefinite" restart="never" nodeType="tmRoot">
+          <p:childTnLst>
+            <p:seq concurrent="1" nextAc="seek">
+              <p:cTn id="2" dur="indefinite" nodeType="mainSeq">
+                <p:childTnLst>
+                  <p:par>
+                    <p:cTn id="3" fill="hold" nodeType="clickPar">
+                      <p:stCondLst>
+                        <p:cond delay="indefinite"/>
+                      </p:stCondLst>
+                      <p:childTnLst>
+                        <p:par>
+                          <p:cTn id="4" fill="hold" nodeType="withGroup">
+                            <p:stCondLst>
+                              <p:cond delay="0"/>
+                            </p:stCondLst>
+                            <p:childTnLst>
+                              <p:par>
+                                <p:cTn id="5" presetID="1" presetClass="entr" presetSubtype="0" fill="hold" nodeType="clickEffect">
+                                  <p:stCondLst>
+                                    <p:cond delay="0"/>
+                                  </p:stCondLst>
+                                  <p:childTnLst>
+                                    <p:set>
+                                      <p:cBhvr>
+                                        <p:cTn id="6" dur="1" fill="hold">
+                                          <p:stCondLst>
+                                            <p:cond delay="0"/>
+                                          </p:stCondLst>
+                                        </p:cTn>
+                                        <p:tgtEl>
+                                          <p:spTgt spid="3">
+                                            <p:txEl>
+                                              <p:pRg st="1" end="1"/>
+                                            </p:txEl>
+                                          </p:spTgt>
+                                        </p:tgtEl>
+                                        <p:attrNameLst>
+                                          <p:attrName>style.visibility</p:attrName>
+                                        </p:attrNameLst>
+                                      </p:cBhvr>
+                                      <p:to>
+                                        <p:strVal val="visible"/>
+                                      </p:to>
+                                    </p:set>
+                                  </p:childTnLst>
+                                </p:cTn>
+                              </p:par>
+                            </p:childTnLst>
+                          </p:cTn>
+                        </p:par>
+                      </p:childTnLst>
+                    </p:cTn>
+                  </p:par>
+                  <p:par>
+                    <p:cTn id="7" fill="hold" nodeType="clickPar">
+                      <p:stCondLst>
+                        <p:cond delay="indefinite"/>
+                      </p:stCondLst>
+                      <p:childTnLst>
+                        <p:par>
+                          <p:cTn id="8" fill="hold" nodeType="withGroup">
+                            <p:stCondLst>
+                              <p:cond delay="0"/>
+                            </p:stCondLst>
+                            <p:childTnLst>
+                              <p:par>
+                                <p:cTn id="9" presetID="1" presetClass="entr" presetSubtype="0" fill="hold" nodeType="clickEffect">
+                                  <p:stCondLst>
+                                    <p:cond delay="0"/>
+                                  </p:stCondLst>
+                                  <p:childTnLst>
+                                    <p:set>
+                                      <p:cBhvr>
+                                        <p:cTn id="10" dur="1" fill="hold">
+                                          <p:stCondLst>
+                                            <p:cond delay="0"/>
+                                          </p:stCondLst>
+                                        </p:cTn>
+                                        <p:tgtEl>
+                                          <p:spTgt spid="3">
+                                            <p:txEl>
+                                              <p:pRg st="2" end="2"/>
+                                            </p:txEl>
+                                          </p:spTgt>
+                                        </p:tgtEl>
+                                        <p:attrNameLst>
+                                          <p:attrName>style.visibility</p:attrName>
+                                        </p:attrNameLst>
+                                      </p:cBhvr>
+                                      <p:to>
+                                        <p:strVal val="visible"/>
+                                      </p:to>
+                                    </p:set>
+                                  </p:childTnLst>
+                                </p:cTn>
+                              </p:par>
+                            </p:childTnLst>
+                          </p:cTn>
+                        </p:par>
+                      </p:childTnLst>
+                    </p:cTn>
+                  </p:par>
+                  <p:par>
+                    <p:cTn id="11" fill="hold" nodeType="clickPar">
+                      <p:stCondLst>
+                        <p:cond delay="indefinite"/>
+                      </p:stCondLst>
+                      <p:childTnLst>
+                        <p:par>
+                          <p:cTn id="12" fill="hold" nodeType="withGroup">
+                            <p:stCondLst>
+                              <p:cond delay="0"/>
+                            </p:stCondLst>
+                            <p:childTnLst>
+                              <p:par>
+                                <p:cTn id="13" presetID="1" presetClass="entr" presetSubtype="0" fill="hold" nodeType="clickEffect">
+                                  <p:stCondLst>
+                                    <p:cond delay="0"/>
+                                  </p:stCondLst>
+                                  <p:childTnLst>
+                                    <p:set>
+                                      <p:cBhvr>
+                                        <p:cTn id="14" dur="1" fill="hold">
+                                          <p:stCondLst>
+                                            <p:cond delay="0"/>
+                                          </p:stCondLst>
+                                        </p:cTn>
+                                        <p:tgtEl>
+                                          <p:spTgt spid="3">
+                                            <p:txEl>
+                                              <p:pRg st="3" end="3"/>
+                                            </p:txEl>
+                                          </p:spTgt>
+                                        </p:tgtEl>
+                                        <p:attrNameLst>
+                                          <p:attrName>style.visibility</p:attrName>
+                                        </p:attrNameLst>
+                                      </p:cBhvr>
+                                      <p:to>
+                                        <p:strVal val="visible"/>
+                                      </p:to>
+                                    </p:set>
+                                  </p:childTnLst>
+                                </p:cTn>
+                              </p:par>
+                            </p:childTnLst>
+                          </p:cTn>
+                        </p:par>
+                      </p:childTnLst>
+                    </p:cTn>
+                  </p:par>
+                  <p:par>
+                    <p:cTn id="15" fill="hold" nodeType="clickPar">
+                      <p:stCondLst>
+                        <p:cond delay="indefinite"/>
+                      </p:stCondLst>
+                      <p:childTnLst>
+                        <p:par>
+                          <p:cTn id="16" fill="hold" nodeType="withGroup">
+                            <p:stCondLst>
+                              <p:cond delay="0"/>
+                            </p:stCondLst>
+                            <p:childTnLst>
+                              <p:par>
+                                <p:cTn id="17" presetID="1" presetClass="entr" presetSubtype="0" fill="hold" nodeType="clickEffect">
+                                  <p:stCondLst>
+                                    <p:cond delay="0"/>
+                                  </p:stCondLst>
+                                  <p:childTnLst>
+                                    <p:set>
+                                      <p:cBhvr>
+                                        <p:cTn id="18" dur="1" fill="hold">
+                                          <p:stCondLst>
+                                            <p:cond delay="0"/>
+                                          </p:stCondLst>
+                                        </p:cTn>
+                                        <p:tgtEl>
+                                          <p:spTgt spid="3">
+                                            <p:txEl>
+                                              <p:pRg st="4" end="4"/>
+                                            </p:txEl>
+                                          </p:spTgt>
+                                        </p:tgtEl>
+                                        <p:attrNameLst>
+                                          <p:attrName>style.visibility</p:attrName>
+                                        </p:attrNameLst>
+                                      </p:cBhvr>
+                                      <p:to>
+                                        <p:strVal val="visible"/>
+                                      </p:to>
+                                    </p:set>
+                                  </p:childTnLst>
+                                </p:cTn>
+                              </p:par>
+                            </p:childTnLst>
+                          </p:cTn>
+                        </p:par>
+                      </p:childTnLst>
+                    </p:cTn>
+                  </p:par>
+                  <p:par>
+                    <p:cTn id="19" fill="hold" nodeType="clickPar">
+                      <p:stCondLst>
+                        <p:cond delay="indefinite"/>
+                      </p:stCondLst>
+                      <p:childTnLst>
+                        <p:par>
+                          <p:cTn id="20" fill="hold" nodeType="withGroup">
+                            <p:stCondLst>
+                              <p:cond delay="0"/>
+                            </p:stCondLst>
+                            <p:childTnLst>
+                              <p:par>
+                                <p:cTn id="21" presetID="1" presetClass="entr" presetSubtype="0" fill="hold" nodeType="clickEffect">
+                                  <p:stCondLst>
+                                    <p:cond delay="0"/>
+                                  </p:stCondLst>
+                                  <p:childTnLst>
+                                    <p:set>
+                                      <p:cBhvr>
+                                        <p:cTn id="22" dur="1" fill="hold">
+                                          <p:stCondLst>
+                                            <p:cond delay="0"/>
+                                          </p:stCondLst>
+                                        </p:cTn>
+                                        <p:tgtEl>
+                                          <p:spTgt spid="3">
+                                            <p:txEl>
+                                              <p:pRg st="5" end="5"/>
+                                            </p:txEl>
+                                          </p:spTgt>
+                                        </p:tgtEl>
+                                        <p:attrNameLst>
+                                          <p:attrName>style.visibility</p:attrName>
+                                        </p:attrNameLst>
+                                      </p:cBhvr>
+                                      <p:to>
+                                        <p:strVal val="visible"/>
+                                      </p:to>
+                                    </p:set>
+                                  </p:childTnLst>
+                                </p:cTn>
+                              </p:par>
+                            </p:childTnLst>
+                          </p:cTn>
+                        </p:par>
+                      </p:childTnLst>
+                    </p:cTn>
+                  </p:par>
+                  <p:par>
+                    <p:cTn id="23" fill="hold" nodeType="clickPar">
+                      <p:stCondLst>
+                        <p:cond delay="indefinite"/>
+                      </p:stCondLst>
+                      <p:childTnLst>
+                        <p:par>
+                          <p:cTn id="24" fill="hold" nodeType="withGroup">
+                            <p:stCondLst>
+                              <p:cond delay="0"/>
+                            </p:stCondLst>
+                            <p:childTnLst>
+                              <p:par>
+                                <p:cTn id="25" presetID="1" presetClass="entr" presetSubtype="0" fill="hold" nodeType="clickEffect">
+                                  <p:stCondLst>
+                                    <p:cond delay="0"/>
+                                  </p:stCondLst>
+                                  <p:childTnLst>
+                                    <p:set>
+                                      <p:cBhvr>
+                                        <p:cTn id="26" dur="1" fill="hold">
+                                          <p:stCondLst>
+                                            <p:cond delay="0"/>
+                                          </p:stCondLst>
+                                        </p:cTn>
+                                        <p:tgtEl>
+                                          <p:spTgt spid="3">
+                                            <p:txEl>
+                                              <p:pRg st="6" end="6"/>
+                                            </p:txEl>
+                                          </p:spTgt>
+                                        </p:tgtEl>
+                                        <p:attrNameLst>
+                                          <p:attrName>style.visibility</p:attrName>
+                                        </p:attrNameLst>
+                                      </p:cBhvr>
+                                      <p:to>
+                                        <p:strVal val="visible"/>
+                                      </p:to>
+                                    </p:set>
+                                  </p:childTnLst>
+                                </p:cTn>
+                              </p:par>
+                            </p:childTnLst>
+                          </p:cTn>
+                        </p:par>
+                      </p:childTnLst>
+                    </p:cTn>
+                  </p:par>
+                  <p:par>
+                    <p:cTn id="27" fill="hold" nodeType="clickPar">
+                      <p:stCondLst>
+                        <p:cond delay="indefinite"/>
+                      </p:stCondLst>
+                      <p:childTnLst>
+                        <p:par>
+                          <p:cTn id="28" fill="hold" nodeType="withGroup">
+                            <p:stCondLst>
+                              <p:cond delay="0"/>
+                            </p:stCondLst>
+                            <p:childTnLst>
+                              <p:par>
+                                <p:cTn id="29" presetID="1" presetClass="entr" presetSubtype="0" fill="hold" nodeType="clickEffect">
+                                  <p:stCondLst>
+                                    <p:cond delay="0"/>
+                                  </p:stCondLst>
+                                  <p:childTnLst>
+                                    <p:set>
+                                      <p:cBhvr>
+                                        <p:cTn id="30" dur="1" fill="hold">
+                                          <p:stCondLst>
+                                            <p:cond delay="0"/>
+                                          </p:stCondLst>
+                                        </p:cTn>
+                                        <p:tgtEl>
+                                          <p:spTgt spid="3">
+                                            <p:txEl>
+                                              <p:pRg st="7" end="7"/>
+                                            </p:txEl>
+                                          </p:spTgt>
+                                        </p:tgtEl>
+                                        <p:attrNameLst>
+                                          <p:attrName>style.visibility</p:attrName>
+                                        </p:attrNameLst>
+                                      </p:cBhvr>
+                                      <p:to>
+                                        <p:strVal val="visible"/>
+                                      </p:to>
+                                    </p:set>
+                                  </p:childTnLst>
+                                </p:cTn>
+                              </p:par>
+                            </p:childTnLst>
+                          </p:cTn>
+                        </p:par>
+                      </p:childTnLst>
+                    </p:cTn>
+                  </p:par>
+                </p:childTnLst>
+              </p:cTn>
+              <p:prevCondLst>
+                <p:cond evt="onPrev" delay="0">
+                  <p:tgtEl>
+                    <p:sldTgt/>
+                  </p:tgtEl>
+                </p:cond>
+              </p:prevCondLst>
+              <p:nextCondLst>
+                <p:cond evt="onNext" delay="0">
+                  <p:tgtEl>
+                    <p:sldTgt/>
+                  </p:tgtEl>
+                </p:cond>
+              </p:nextCondLst>
+            </p:seq>
+          </p:childTnLst>
+        </p:cTn>
+      </p:par>
+    </p:tnLst>
+  </p:timing>
+</p:sld>
+</file>
+
+<file path=ppt/slides/slide15.xml><?xml version="1.0" encoding="utf-8"?>
+<p:sld xmlns:a="http://schemas.openxmlformats.org/drawingml/2006/main" xmlns:r="http://schemas.openxmlformats.org/officeDocument/2006/relationships" xmlns:p="http://schemas.openxmlformats.org/presentationml/2006/main">
+  <p:cSld>
+    <p:spTree>
+      <p:nvGrpSpPr>
+        <p:cNvPr id="1" name=""/>
+        <p:cNvGrpSpPr/>
+        <p:nvPr/>
+      </p:nvGrpSpPr>
+      <p:grpSpPr>
+        <a:xfrm>
+          <a:off x="0" y="0"/>
+          <a:ext cx="0" cy="0"/>
+          <a:chOff x="0" y="0"/>
+          <a:chExt cx="0" cy="0"/>
+        </a:xfrm>
+      </p:grpSpPr>
+      <p:sp>
+        <p:nvSpPr>
           <p:cNvPr id="34817" name="Title 1"/>
           <p:cNvSpPr>
             <a:spLocks noGrp="1"/>
@@ -8266,7 +9023,7 @@
 </p:sld>
 </file>
 
-<file path=ppt/slides/slide15.xml><?xml version="1.0" encoding="utf-8"?>
+<file path=ppt/slides/slide16.xml><?xml version="1.0" encoding="utf-8"?>
 <p:sld xmlns:a="http://schemas.openxmlformats.org/drawingml/2006/main" xmlns:r="http://schemas.openxmlformats.org/officeDocument/2006/relationships" xmlns:p="http://schemas.openxmlformats.org/presentationml/2006/main">
   <p:cSld>
     <p:spTree>
@@ -8381,7 +9138,7 @@
           <a:lstStyle/>
           <a:p>
             <a:r>
-              <a:rPr lang="en-US" altLang="en-US">
+              <a:rPr lang="en-US" altLang="en-US" dirty="0">
                 <a:ea typeface="ＭＳ Ｐゴシック" charset="-128"/>
               </a:rPr>
               <a:t>Authenticate user</a:t>
@@ -8390,7 +9147,7 @@
           <a:p>
             <a:pPr lvl="1"/>
             <a:r>
-              <a:rPr lang="en-US" altLang="en-US">
+              <a:rPr lang="en-US" altLang="en-US" dirty="0">
                 <a:ea typeface="ＭＳ Ｐゴシック" charset="-128"/>
               </a:rPr>
               <a:t>Database with user PIN</a:t>
@@ -8399,7 +9156,7 @@
           <a:p>
             <a:pPr lvl="1"/>
             <a:r>
-              <a:rPr lang="en-US" altLang="en-US">
+              <a:rPr lang="en-US" altLang="en-US" dirty="0">
                 <a:ea typeface="ＭＳ Ｐゴシック" charset="-128"/>
               </a:rPr>
               <a:t>User interface that reads ATM card</a:t>
@@ -8408,7 +9165,7 @@
           <a:p>
             <a:pPr lvl="1"/>
             <a:r>
-              <a:rPr lang="en-US" altLang="en-US">
+              <a:rPr lang="en-US" altLang="en-US" dirty="0">
                 <a:ea typeface="ＭＳ Ｐゴシック" charset="-128"/>
               </a:rPr>
               <a:t>User interface that reads user PIN</a:t>
@@ -8417,7 +9174,7 @@
           <a:p>
             <a:pPr lvl="1"/>
             <a:r>
-              <a:rPr lang="en-US" altLang="en-US">
+              <a:rPr lang="en-US" altLang="en-US" dirty="0">
                 <a:ea typeface="ＭＳ Ｐゴシック" charset="-128"/>
               </a:rPr>
               <a:t>Control logic</a:t>
@@ -8425,7 +9182,7 @@
           </a:p>
           <a:p>
             <a:r>
-              <a:rPr lang="en-US" altLang="en-US">
+              <a:rPr lang="en-US" altLang="en-US" dirty="0">
                 <a:ea typeface="ＭＳ Ｐゴシック" charset="-128"/>
               </a:rPr>
               <a:t>Get cash</a:t>
@@ -8434,7 +9191,7 @@
           <a:p>
             <a:pPr lvl="1"/>
             <a:r>
-              <a:rPr lang="en-US" altLang="en-US">
+              <a:rPr lang="en-US" altLang="en-US" dirty="0">
                 <a:ea typeface="ＭＳ Ｐゴシック" charset="-128"/>
               </a:rPr>
               <a:t>Database with users cash balance</a:t>
@@ -8443,7 +9200,7 @@
           <a:p>
             <a:pPr lvl="1"/>
             <a:r>
-              <a:rPr lang="en-US" altLang="en-US">
+              <a:rPr lang="en-US" altLang="en-US" dirty="0">
                 <a:ea typeface="ＭＳ Ｐゴシック" charset="-128"/>
               </a:rPr>
               <a:t>User interface that reads user cash requested</a:t>
@@ -8452,7 +9209,7 @@
           <a:p>
             <a:pPr lvl="1"/>
             <a:r>
-              <a:rPr lang="en-US" altLang="en-US">
+              <a:rPr lang="en-US" altLang="en-US" dirty="0">
                 <a:ea typeface="ＭＳ Ｐゴシック" charset="-128"/>
               </a:rPr>
               <a:t>Cash drawer interface that dispenses cash</a:t>
@@ -8461,7 +9218,7 @@
           <a:p>
             <a:pPr lvl="1"/>
             <a:r>
-              <a:rPr lang="en-US" altLang="en-US">
+              <a:rPr lang="en-US" altLang="en-US" dirty="0">
                 <a:ea typeface="ＭＳ Ｐゴシック" charset="-128"/>
               </a:rPr>
               <a:t>Control logic</a:t>
@@ -8995,7 +9752,823 @@
 </p:sld>
 </file>
 
-<file path=ppt/slides/slide16.xml><?xml version="1.0" encoding="utf-8"?>
+<file path=ppt/slides/slide17.xml><?xml version="1.0" encoding="utf-8"?>
+<p:sld xmlns:a="http://schemas.openxmlformats.org/drawingml/2006/main" xmlns:r="http://schemas.openxmlformats.org/officeDocument/2006/relationships" xmlns:p="http://schemas.openxmlformats.org/presentationml/2006/main">
+  <p:cSld>
+    <p:spTree>
+      <p:nvGrpSpPr>
+        <p:cNvPr id="1" name=""/>
+        <p:cNvGrpSpPr/>
+        <p:nvPr/>
+      </p:nvGrpSpPr>
+      <p:grpSpPr>
+        <a:xfrm>
+          <a:off x="0" y="0"/>
+          <a:ext cx="0" cy="0"/>
+          <a:chOff x="0" y="0"/>
+          <a:chExt cx="0" cy="0"/>
+        </a:xfrm>
+      </p:grpSpPr>
+      <p:sp>
+        <p:nvSpPr>
+          <p:cNvPr id="33793" name="Title 1"/>
+          <p:cNvSpPr>
+            <a:spLocks noGrp="1"/>
+          </p:cNvSpPr>
+          <p:nvPr>
+            <p:ph type="title"/>
+          </p:nvPr>
+        </p:nvSpPr>
+        <p:spPr bwMode="auto">
+          <a:noFill/>
+          <a:extLst>
+            <a:ext uri="{909E8E84-426E-40DD-AFC4-6F175D3DCCD1}">
+              <a14:hiddenFill xmlns:a14="http://schemas.microsoft.com/office/drawing/2010/main">
+                <a:solidFill>
+                  <a:srgbClr val="FFFFFF"/>
+                </a:solidFill>
+              </a14:hiddenFill>
+            </a:ext>
+            <a:ext uri="{91240B29-F687-4F45-9708-019B960494DF}">
+              <a14:hiddenLine xmlns:a14="http://schemas.microsoft.com/office/drawing/2010/main" w="9525">
+                <a:solidFill>
+                  <a:srgbClr val="000000"/>
+                </a:solidFill>
+                <a:miter lim="800000"/>
+                <a:headEnd/>
+                <a:tailEnd/>
+              </a14:hiddenLine>
+            </a:ext>
+          </a:extLst>
+        </p:spPr>
+        <p:txBody>
+          <a:bodyPr vert="horz" wrap="square" lIns="91440" tIns="45720" rIns="91440" bIns="45720" numCol="1" anchor="t" anchorCtr="0" compatLnSpc="1">
+            <a:prstTxWarp prst="textNoShape">
+              <a:avLst/>
+            </a:prstTxWarp>
+          </a:bodyPr>
+          <a:lstStyle/>
+          <a:p>
+            <a:r>
+              <a:rPr lang="en-US" altLang="en-US" dirty="0">
+                <a:ea typeface="ＭＳ Ｐゴシック" charset="-128"/>
+              </a:rPr>
+              <a:t>Use case: Authenticate user</a:t>
+            </a:r>
+            <a:endParaRPr lang="en-US" altLang="en-US" i="1" dirty="0">
+              <a:ea typeface="ＭＳ Ｐゴシック" charset="-128"/>
+            </a:endParaRPr>
+          </a:p>
+        </p:txBody>
+      </p:sp>
+      <p:sp>
+        <p:nvSpPr>
+          <p:cNvPr id="3" name="Content Placeholder 2"/>
+          <p:cNvSpPr>
+            <a:spLocks noGrp="1"/>
+          </p:cNvSpPr>
+          <p:nvPr>
+            <p:ph idx="1"/>
+          </p:nvPr>
+        </p:nvSpPr>
+        <p:spPr bwMode="auto">
+          <a:xfrm>
+            <a:off x="457200" y="789826"/>
+            <a:ext cx="8229600" cy="4572000"/>
+          </a:xfrm>
+          <a:noFill/>
+          <a:extLst>
+            <a:ext uri="{909E8E84-426E-40DD-AFC4-6F175D3DCCD1}">
+              <a14:hiddenFill xmlns:a14="http://schemas.microsoft.com/office/drawing/2010/main">
+                <a:solidFill>
+                  <a:srgbClr val="FFFFFF"/>
+                </a:solidFill>
+              </a14:hiddenFill>
+            </a:ext>
+            <a:ext uri="{91240B29-F687-4F45-9708-019B960494DF}">
+              <a14:hiddenLine xmlns:a14="http://schemas.microsoft.com/office/drawing/2010/main" w="9525">
+                <a:solidFill>
+                  <a:srgbClr val="000000"/>
+                </a:solidFill>
+                <a:miter lim="800000"/>
+                <a:headEnd/>
+                <a:tailEnd/>
+              </a14:hiddenLine>
+            </a:ext>
+          </a:extLst>
+        </p:spPr>
+        <p:txBody>
+          <a:bodyPr vert="horz" wrap="square" lIns="91440" tIns="45720" rIns="91440" bIns="45720" numCol="1" anchor="t" anchorCtr="0" compatLnSpc="1">
+            <a:prstTxWarp prst="textNoShape">
+              <a:avLst/>
+            </a:prstTxWarp>
+          </a:bodyPr>
+          <a:lstStyle/>
+          <a:p>
+            <a:r>
+              <a:rPr lang="en-US" altLang="en-US" dirty="0">
+                <a:ea typeface="ＭＳ Ｐゴシック" charset="-128"/>
+              </a:rPr>
+              <a:t>Name</a:t>
+            </a:r>
+          </a:p>
+          <a:p>
+            <a:pPr lvl="1"/>
+            <a:r>
+              <a:rPr lang="en-US" altLang="en-US" dirty="0" err="1">
+                <a:latin typeface="Courier New" charset="0"/>
+                <a:ea typeface="ＭＳ Ｐゴシック" charset="-128"/>
+              </a:rPr>
+              <a:t>AuthenticateUser</a:t>
+            </a:r>
+            <a:endParaRPr lang="en-US" altLang="en-US" dirty="0">
+              <a:latin typeface="Courier New" charset="0"/>
+              <a:ea typeface="ＭＳ Ｐゴシック" charset="-128"/>
+            </a:endParaRPr>
+          </a:p>
+          <a:p>
+            <a:r>
+              <a:rPr lang="en-US" altLang="en-US" dirty="0">
+                <a:ea typeface="ＭＳ Ｐゴシック" charset="-128"/>
+              </a:rPr>
+              <a:t>What it does:</a:t>
+            </a:r>
+          </a:p>
+          <a:p>
+            <a:pPr lvl="1"/>
+            <a:r>
+              <a:rPr lang="en-US" altLang="en-US" dirty="0">
+                <a:ea typeface="ＭＳ Ｐゴシック" charset="-128"/>
+              </a:rPr>
+              <a:t>Verifies a user is in the database and that the pin supplied by the user is correct</a:t>
+            </a:r>
+            <a:endParaRPr lang="en-US" altLang="en-US" i="1" dirty="0">
+              <a:ea typeface="ＭＳ Ｐゴシック" charset="-128"/>
+            </a:endParaRPr>
+          </a:p>
+          <a:p>
+            <a:r>
+              <a:rPr lang="en-US" altLang="en-US" dirty="0">
+                <a:ea typeface="ＭＳ Ｐゴシック" charset="-128"/>
+              </a:rPr>
+              <a:t>Inputs (with type information)</a:t>
+            </a:r>
+          </a:p>
+          <a:p>
+            <a:pPr lvl="1"/>
+            <a:r>
+              <a:rPr lang="en-US" altLang="en-US" i="1" dirty="0">
+                <a:ea typeface="ＭＳ Ｐゴシック" charset="-128"/>
+              </a:rPr>
+              <a:t>Card number,</a:t>
+            </a:r>
+            <a:r>
+              <a:rPr lang="en-US" altLang="en-US" dirty="0">
+                <a:ea typeface="ＭＳ Ｐゴシック" charset="-128"/>
+              </a:rPr>
+              <a:t> a string that is the user’s card no.</a:t>
+            </a:r>
+            <a:endParaRPr lang="en-US" altLang="en-US" i="1" dirty="0">
+              <a:ea typeface="ＭＳ Ｐゴシック" charset="-128"/>
+            </a:endParaRPr>
+          </a:p>
+          <a:p>
+            <a:pPr lvl="1"/>
+            <a:r>
+              <a:rPr lang="en-US" altLang="en-US" i="1" dirty="0">
+                <a:ea typeface="ＭＳ Ｐゴシック" charset="-128"/>
+              </a:rPr>
+              <a:t>Pin</a:t>
+            </a:r>
+            <a:r>
+              <a:rPr lang="en-US" altLang="en-US" dirty="0">
+                <a:ea typeface="ＭＳ Ｐゴシック" charset="-128"/>
+              </a:rPr>
+              <a:t>, an integer</a:t>
+            </a:r>
+          </a:p>
+          <a:p>
+            <a:r>
+              <a:rPr lang="en-US" altLang="en-US" dirty="0">
+                <a:ea typeface="ＭＳ Ｐゴシック" charset="-128"/>
+              </a:rPr>
+              <a:t>Outputs (with type information)</a:t>
+            </a:r>
+          </a:p>
+          <a:p>
+            <a:pPr lvl="1"/>
+            <a:r>
+              <a:rPr lang="en-US" altLang="en-US" dirty="0">
+                <a:ea typeface="ＭＳ Ｐゴシック" charset="-128"/>
+              </a:rPr>
+              <a:t>Boolean: True if success, False if failure</a:t>
+            </a:r>
+          </a:p>
+          <a:p>
+            <a:endParaRPr lang="en-US" altLang="en-US" dirty="0">
+              <a:latin typeface="Arial" charset="0"/>
+              <a:ea typeface="ＭＳ Ｐゴシック" charset="-128"/>
+            </a:endParaRPr>
+          </a:p>
+          <a:p>
+            <a:endParaRPr lang="en-US" altLang="en-US" dirty="0">
+              <a:latin typeface="Courier New" charset="0"/>
+              <a:ea typeface="ＭＳ Ｐゴシック" charset="-128"/>
+            </a:endParaRPr>
+          </a:p>
+        </p:txBody>
+      </p:sp>
+      <p:sp>
+        <p:nvSpPr>
+          <p:cNvPr id="33795" name="Footer Placeholder 3"/>
+          <p:cNvSpPr>
+            <a:spLocks noGrp="1"/>
+          </p:cNvSpPr>
+          <p:nvPr>
+            <p:ph type="ftr" sz="quarter" idx="4294967295"/>
+          </p:nvPr>
+        </p:nvSpPr>
+        <p:spPr bwMode="auto">
+          <a:xfrm>
+            <a:off x="3124200" y="6307224"/>
+            <a:ext cx="2895600" cy="365125"/>
+          </a:xfrm>
+          <a:noFill/>
+          <a:extLst>
+            <a:ext uri="{909E8E84-426E-40DD-AFC4-6F175D3DCCD1}">
+              <a14:hiddenFill xmlns:a14="http://schemas.microsoft.com/office/drawing/2010/main">
+                <a:solidFill>
+                  <a:srgbClr val="FFFFFF"/>
+                </a:solidFill>
+              </a14:hiddenFill>
+            </a:ext>
+            <a:ext uri="{91240B29-F687-4F45-9708-019B960494DF}">
+              <a14:hiddenLine xmlns:a14="http://schemas.microsoft.com/office/drawing/2010/main" w="9525">
+                <a:solidFill>
+                  <a:srgbClr val="000000"/>
+                </a:solidFill>
+                <a:miter lim="800000"/>
+                <a:headEnd/>
+                <a:tailEnd/>
+              </a14:hiddenLine>
+            </a:ext>
+          </a:extLst>
+        </p:spPr>
+        <p:txBody>
+          <a:bodyPr/>
+          <a:lstStyle>
+            <a:lvl1pPr>
+              <a:defRPr>
+                <a:solidFill>
+                  <a:schemeClr val="tx1"/>
+                </a:solidFill>
+                <a:latin typeface="Arial" charset="0"/>
+                <a:ea typeface="ＭＳ Ｐゴシック" charset="-128"/>
+              </a:defRPr>
+            </a:lvl1pPr>
+            <a:lvl2pPr marL="742950" indent="-285750">
+              <a:defRPr>
+                <a:solidFill>
+                  <a:schemeClr val="tx1"/>
+                </a:solidFill>
+                <a:latin typeface="Arial" charset="0"/>
+                <a:ea typeface="ＭＳ Ｐゴシック" charset="-128"/>
+              </a:defRPr>
+            </a:lvl2pPr>
+            <a:lvl3pPr marL="1143000" indent="-228600">
+              <a:defRPr>
+                <a:solidFill>
+                  <a:schemeClr val="tx1"/>
+                </a:solidFill>
+                <a:latin typeface="Arial" charset="0"/>
+                <a:ea typeface="ＭＳ Ｐゴシック" charset="-128"/>
+              </a:defRPr>
+            </a:lvl3pPr>
+            <a:lvl4pPr marL="1600200" indent="-228600">
+              <a:defRPr>
+                <a:solidFill>
+                  <a:schemeClr val="tx1"/>
+                </a:solidFill>
+                <a:latin typeface="Arial" charset="0"/>
+                <a:ea typeface="ＭＳ Ｐゴシック" charset="-128"/>
+              </a:defRPr>
+            </a:lvl4pPr>
+            <a:lvl5pPr marL="2057400" indent="-228600">
+              <a:defRPr>
+                <a:solidFill>
+                  <a:schemeClr val="tx1"/>
+                </a:solidFill>
+                <a:latin typeface="Arial" charset="0"/>
+                <a:ea typeface="ＭＳ Ｐゴシック" charset="-128"/>
+              </a:defRPr>
+            </a:lvl5pPr>
+            <a:lvl6pPr marL="2514600" indent="-228600" defTabSz="457200" eaLnBrk="0" fontAlgn="base" hangingPunct="0">
+              <a:spcBef>
+                <a:spcPct val="0"/>
+              </a:spcBef>
+              <a:spcAft>
+                <a:spcPct val="0"/>
+              </a:spcAft>
+              <a:defRPr>
+                <a:solidFill>
+                  <a:schemeClr val="tx1"/>
+                </a:solidFill>
+                <a:latin typeface="Arial" charset="0"/>
+                <a:ea typeface="ＭＳ Ｐゴシック" charset="-128"/>
+              </a:defRPr>
+            </a:lvl6pPr>
+            <a:lvl7pPr marL="2971800" indent="-228600" defTabSz="457200" eaLnBrk="0" fontAlgn="base" hangingPunct="0">
+              <a:spcBef>
+                <a:spcPct val="0"/>
+              </a:spcBef>
+              <a:spcAft>
+                <a:spcPct val="0"/>
+              </a:spcAft>
+              <a:defRPr>
+                <a:solidFill>
+                  <a:schemeClr val="tx1"/>
+                </a:solidFill>
+                <a:latin typeface="Arial" charset="0"/>
+                <a:ea typeface="ＭＳ Ｐゴシック" charset="-128"/>
+              </a:defRPr>
+            </a:lvl7pPr>
+            <a:lvl8pPr marL="3429000" indent="-228600" defTabSz="457200" eaLnBrk="0" fontAlgn="base" hangingPunct="0">
+              <a:spcBef>
+                <a:spcPct val="0"/>
+              </a:spcBef>
+              <a:spcAft>
+                <a:spcPct val="0"/>
+              </a:spcAft>
+              <a:defRPr>
+                <a:solidFill>
+                  <a:schemeClr val="tx1"/>
+                </a:solidFill>
+                <a:latin typeface="Arial" charset="0"/>
+                <a:ea typeface="ＭＳ Ｐゴシック" charset="-128"/>
+              </a:defRPr>
+            </a:lvl8pPr>
+            <a:lvl9pPr marL="3886200" indent="-228600" defTabSz="457200" eaLnBrk="0" fontAlgn="base" hangingPunct="0">
+              <a:spcBef>
+                <a:spcPct val="0"/>
+              </a:spcBef>
+              <a:spcAft>
+                <a:spcPct val="0"/>
+              </a:spcAft>
+              <a:defRPr>
+                <a:solidFill>
+                  <a:schemeClr val="tx1"/>
+                </a:solidFill>
+                <a:latin typeface="Arial" charset="0"/>
+                <a:ea typeface="ＭＳ Ｐゴシック" charset="-128"/>
+              </a:defRPr>
+            </a:lvl9pPr>
+          </a:lstStyle>
+          <a:p>
+            <a:endParaRPr lang="en-US" altLang="en-US" dirty="0">
+              <a:solidFill>
+                <a:srgbClr val="898989"/>
+              </a:solidFill>
+              <a:latin typeface="Calibri" charset="0"/>
+            </a:endParaRPr>
+          </a:p>
+        </p:txBody>
+      </p:sp>
+    </p:spTree>
+    <p:extLst>
+      <p:ext uri="{BB962C8B-B14F-4D97-AF65-F5344CB8AC3E}">
+        <p14:creationId xmlns:p14="http://schemas.microsoft.com/office/powerpoint/2010/main" val="2311031678"/>
+      </p:ext>
+    </p:extLst>
+  </p:cSld>
+  <p:clrMapOvr>
+    <a:masterClrMapping/>
+  </p:clrMapOvr>
+  <p:timing>
+    <p:tnLst>
+      <p:par>
+        <p:cTn id="1" dur="indefinite" restart="never" nodeType="tmRoot">
+          <p:childTnLst>
+            <p:seq concurrent="1" nextAc="seek">
+              <p:cTn id="2" dur="indefinite" nodeType="mainSeq">
+                <p:childTnLst>
+                  <p:par>
+                    <p:cTn id="3" fill="hold" nodeType="clickPar">
+                      <p:stCondLst>
+                        <p:cond delay="indefinite"/>
+                      </p:stCondLst>
+                      <p:childTnLst>
+                        <p:par>
+                          <p:cTn id="4" fill="hold" nodeType="withGroup">
+                            <p:stCondLst>
+                              <p:cond delay="0"/>
+                            </p:stCondLst>
+                            <p:childTnLst>
+                              <p:par>
+                                <p:cTn id="5" presetID="1" presetClass="entr" presetSubtype="0" fill="hold" nodeType="clickEffect">
+                                  <p:stCondLst>
+                                    <p:cond delay="0"/>
+                                  </p:stCondLst>
+                                  <p:childTnLst>
+                                    <p:set>
+                                      <p:cBhvr>
+                                        <p:cTn id="6" dur="1" fill="hold">
+                                          <p:stCondLst>
+                                            <p:cond delay="0"/>
+                                          </p:stCondLst>
+                                        </p:cTn>
+                                        <p:tgtEl>
+                                          <p:spTgt spid="3">
+                                            <p:txEl>
+                                              <p:pRg st="1" end="1"/>
+                                            </p:txEl>
+                                          </p:spTgt>
+                                        </p:tgtEl>
+                                        <p:attrNameLst>
+                                          <p:attrName>style.visibility</p:attrName>
+                                        </p:attrNameLst>
+                                      </p:cBhvr>
+                                      <p:to>
+                                        <p:strVal val="visible"/>
+                                      </p:to>
+                                    </p:set>
+                                  </p:childTnLst>
+                                </p:cTn>
+                              </p:par>
+                            </p:childTnLst>
+                          </p:cTn>
+                        </p:par>
+                      </p:childTnLst>
+                    </p:cTn>
+                  </p:par>
+                  <p:par>
+                    <p:cTn id="7" fill="hold" nodeType="clickPar">
+                      <p:stCondLst>
+                        <p:cond delay="indefinite"/>
+                      </p:stCondLst>
+                      <p:childTnLst>
+                        <p:par>
+                          <p:cTn id="8" fill="hold" nodeType="withGroup">
+                            <p:stCondLst>
+                              <p:cond delay="0"/>
+                            </p:stCondLst>
+                            <p:childTnLst>
+                              <p:par>
+                                <p:cTn id="9" presetID="1" presetClass="entr" presetSubtype="0" fill="hold" nodeType="clickEffect">
+                                  <p:stCondLst>
+                                    <p:cond delay="0"/>
+                                  </p:stCondLst>
+                                  <p:childTnLst>
+                                    <p:set>
+                                      <p:cBhvr>
+                                        <p:cTn id="10" dur="1" fill="hold">
+                                          <p:stCondLst>
+                                            <p:cond delay="0"/>
+                                          </p:stCondLst>
+                                        </p:cTn>
+                                        <p:tgtEl>
+                                          <p:spTgt spid="3">
+                                            <p:txEl>
+                                              <p:pRg st="2" end="2"/>
+                                            </p:txEl>
+                                          </p:spTgt>
+                                        </p:tgtEl>
+                                        <p:attrNameLst>
+                                          <p:attrName>style.visibility</p:attrName>
+                                        </p:attrNameLst>
+                                      </p:cBhvr>
+                                      <p:to>
+                                        <p:strVal val="visible"/>
+                                      </p:to>
+                                    </p:set>
+                                  </p:childTnLst>
+                                </p:cTn>
+                              </p:par>
+                            </p:childTnLst>
+                          </p:cTn>
+                        </p:par>
+                      </p:childTnLst>
+                    </p:cTn>
+                  </p:par>
+                  <p:par>
+                    <p:cTn id="11" fill="hold" nodeType="clickPar">
+                      <p:stCondLst>
+                        <p:cond delay="indefinite"/>
+                      </p:stCondLst>
+                      <p:childTnLst>
+                        <p:par>
+                          <p:cTn id="12" fill="hold" nodeType="withGroup">
+                            <p:stCondLst>
+                              <p:cond delay="0"/>
+                            </p:stCondLst>
+                            <p:childTnLst>
+                              <p:par>
+                                <p:cTn id="13" presetID="1" presetClass="entr" presetSubtype="0" fill="hold" nodeType="clickEffect">
+                                  <p:stCondLst>
+                                    <p:cond delay="0"/>
+                                  </p:stCondLst>
+                                  <p:childTnLst>
+                                    <p:set>
+                                      <p:cBhvr>
+                                        <p:cTn id="14" dur="1" fill="hold">
+                                          <p:stCondLst>
+                                            <p:cond delay="0"/>
+                                          </p:stCondLst>
+                                        </p:cTn>
+                                        <p:tgtEl>
+                                          <p:spTgt spid="3">
+                                            <p:txEl>
+                                              <p:pRg st="3" end="3"/>
+                                            </p:txEl>
+                                          </p:spTgt>
+                                        </p:tgtEl>
+                                        <p:attrNameLst>
+                                          <p:attrName>style.visibility</p:attrName>
+                                        </p:attrNameLst>
+                                      </p:cBhvr>
+                                      <p:to>
+                                        <p:strVal val="visible"/>
+                                      </p:to>
+                                    </p:set>
+                                  </p:childTnLst>
+                                </p:cTn>
+                              </p:par>
+                            </p:childTnLst>
+                          </p:cTn>
+                        </p:par>
+                      </p:childTnLst>
+                    </p:cTn>
+                  </p:par>
+                  <p:par>
+                    <p:cTn id="15" fill="hold" nodeType="clickPar">
+                      <p:stCondLst>
+                        <p:cond delay="indefinite"/>
+                      </p:stCondLst>
+                      <p:childTnLst>
+                        <p:par>
+                          <p:cTn id="16" fill="hold" nodeType="withGroup">
+                            <p:stCondLst>
+                              <p:cond delay="0"/>
+                            </p:stCondLst>
+                            <p:childTnLst>
+                              <p:par>
+                                <p:cTn id="17" presetID="1" presetClass="entr" presetSubtype="0" fill="hold" nodeType="clickEffect">
+                                  <p:stCondLst>
+                                    <p:cond delay="0"/>
+                                  </p:stCondLst>
+                                  <p:childTnLst>
+                                    <p:set>
+                                      <p:cBhvr>
+                                        <p:cTn id="18" dur="1" fill="hold">
+                                          <p:stCondLst>
+                                            <p:cond delay="0"/>
+                                          </p:stCondLst>
+                                        </p:cTn>
+                                        <p:tgtEl>
+                                          <p:spTgt spid="3">
+                                            <p:txEl>
+                                              <p:pRg st="4" end="4"/>
+                                            </p:txEl>
+                                          </p:spTgt>
+                                        </p:tgtEl>
+                                        <p:attrNameLst>
+                                          <p:attrName>style.visibility</p:attrName>
+                                        </p:attrNameLst>
+                                      </p:cBhvr>
+                                      <p:to>
+                                        <p:strVal val="visible"/>
+                                      </p:to>
+                                    </p:set>
+                                  </p:childTnLst>
+                                </p:cTn>
+                              </p:par>
+                            </p:childTnLst>
+                          </p:cTn>
+                        </p:par>
+                      </p:childTnLst>
+                    </p:cTn>
+                  </p:par>
+                  <p:par>
+                    <p:cTn id="19" fill="hold">
+                      <p:stCondLst>
+                        <p:cond delay="indefinite"/>
+                      </p:stCondLst>
+                      <p:childTnLst>
+                        <p:par>
+                          <p:cTn id="20" fill="hold">
+                            <p:stCondLst>
+                              <p:cond delay="0"/>
+                            </p:stCondLst>
+                            <p:childTnLst>
+                              <p:par>
+                                <p:cTn id="21" presetID="1" presetClass="entr" presetSubtype="0" fill="hold" nodeType="clickEffect">
+                                  <p:stCondLst>
+                                    <p:cond delay="0"/>
+                                  </p:stCondLst>
+                                  <p:childTnLst>
+                                    <p:set>
+                                      <p:cBhvr>
+                                        <p:cTn id="22" dur="1" fill="hold">
+                                          <p:stCondLst>
+                                            <p:cond delay="0"/>
+                                          </p:stCondLst>
+                                        </p:cTn>
+                                        <p:tgtEl>
+                                          <p:spTgt spid="3">
+                                            <p:txEl>
+                                              <p:pRg st="5" end="5"/>
+                                            </p:txEl>
+                                          </p:spTgt>
+                                        </p:tgtEl>
+                                        <p:attrNameLst>
+                                          <p:attrName>style.visibility</p:attrName>
+                                        </p:attrNameLst>
+                                      </p:cBhvr>
+                                      <p:to>
+                                        <p:strVal val="visible"/>
+                                      </p:to>
+                                    </p:set>
+                                  </p:childTnLst>
+                                </p:cTn>
+                              </p:par>
+                            </p:childTnLst>
+                          </p:cTn>
+                        </p:par>
+                      </p:childTnLst>
+                    </p:cTn>
+                  </p:par>
+                  <p:par>
+                    <p:cTn id="23" fill="hold" nodeType="clickPar">
+                      <p:stCondLst>
+                        <p:cond delay="indefinite"/>
+                      </p:stCondLst>
+                      <p:childTnLst>
+                        <p:par>
+                          <p:cTn id="24" fill="hold" nodeType="withGroup">
+                            <p:stCondLst>
+                              <p:cond delay="0"/>
+                            </p:stCondLst>
+                            <p:childTnLst>
+                              <p:par>
+                                <p:cTn id="25" presetID="1" presetClass="entr" presetSubtype="0" fill="hold" nodeType="clickEffect">
+                                  <p:stCondLst>
+                                    <p:cond delay="0"/>
+                                  </p:stCondLst>
+                                  <p:childTnLst>
+                                    <p:set>
+                                      <p:cBhvr>
+                                        <p:cTn id="26" dur="1" fill="hold">
+                                          <p:stCondLst>
+                                            <p:cond delay="0"/>
+                                          </p:stCondLst>
+                                        </p:cTn>
+                                        <p:tgtEl>
+                                          <p:spTgt spid="3">
+                                            <p:txEl>
+                                              <p:pRg st="6" end="6"/>
+                                            </p:txEl>
+                                          </p:spTgt>
+                                        </p:tgtEl>
+                                        <p:attrNameLst>
+                                          <p:attrName>style.visibility</p:attrName>
+                                        </p:attrNameLst>
+                                      </p:cBhvr>
+                                      <p:to>
+                                        <p:strVal val="visible"/>
+                                      </p:to>
+                                    </p:set>
+                                  </p:childTnLst>
+                                </p:cTn>
+                              </p:par>
+                            </p:childTnLst>
+                          </p:cTn>
+                        </p:par>
+                      </p:childTnLst>
+                    </p:cTn>
+                  </p:par>
+                  <p:par>
+                    <p:cTn id="27" fill="hold" nodeType="clickPar">
+                      <p:stCondLst>
+                        <p:cond delay="indefinite"/>
+                      </p:stCondLst>
+                      <p:childTnLst>
+                        <p:par>
+                          <p:cTn id="28" fill="hold" nodeType="withGroup">
+                            <p:stCondLst>
+                              <p:cond delay="0"/>
+                            </p:stCondLst>
+                            <p:childTnLst>
+                              <p:par>
+                                <p:cTn id="29" presetID="1" presetClass="entr" presetSubtype="0" fill="hold" nodeType="clickEffect">
+                                  <p:stCondLst>
+                                    <p:cond delay="0"/>
+                                  </p:stCondLst>
+                                  <p:childTnLst>
+                                    <p:set>
+                                      <p:cBhvr>
+                                        <p:cTn id="30" dur="1" fill="hold">
+                                          <p:stCondLst>
+                                            <p:cond delay="0"/>
+                                          </p:stCondLst>
+                                        </p:cTn>
+                                        <p:tgtEl>
+                                          <p:spTgt spid="3">
+                                            <p:txEl>
+                                              <p:pRg st="7" end="7"/>
+                                            </p:txEl>
+                                          </p:spTgt>
+                                        </p:tgtEl>
+                                        <p:attrNameLst>
+                                          <p:attrName>style.visibility</p:attrName>
+                                        </p:attrNameLst>
+                                      </p:cBhvr>
+                                      <p:to>
+                                        <p:strVal val="visible"/>
+                                      </p:to>
+                                    </p:set>
+                                  </p:childTnLst>
+                                </p:cTn>
+                              </p:par>
+                            </p:childTnLst>
+                          </p:cTn>
+                        </p:par>
+                      </p:childTnLst>
+                    </p:cTn>
+                  </p:par>
+                  <p:par>
+                    <p:cTn id="31" fill="hold">
+                      <p:stCondLst>
+                        <p:cond delay="indefinite"/>
+                      </p:stCondLst>
+                      <p:childTnLst>
+                        <p:par>
+                          <p:cTn id="32" fill="hold">
+                            <p:stCondLst>
+                              <p:cond delay="0"/>
+                            </p:stCondLst>
+                            <p:childTnLst>
+                              <p:par>
+                                <p:cTn id="33" presetID="1" presetClass="entr" presetSubtype="0" fill="hold" nodeType="clickEffect">
+                                  <p:stCondLst>
+                                    <p:cond delay="0"/>
+                                  </p:stCondLst>
+                                  <p:childTnLst>
+                                    <p:set>
+                                      <p:cBhvr>
+                                        <p:cTn id="34" dur="1" fill="hold">
+                                          <p:stCondLst>
+                                            <p:cond delay="0"/>
+                                          </p:stCondLst>
+                                        </p:cTn>
+                                        <p:tgtEl>
+                                          <p:spTgt spid="3">
+                                            <p:txEl>
+                                              <p:pRg st="8" end="8"/>
+                                            </p:txEl>
+                                          </p:spTgt>
+                                        </p:tgtEl>
+                                        <p:attrNameLst>
+                                          <p:attrName>style.visibility</p:attrName>
+                                        </p:attrNameLst>
+                                      </p:cBhvr>
+                                      <p:to>
+                                        <p:strVal val="visible"/>
+                                      </p:to>
+                                    </p:set>
+                                  </p:childTnLst>
+                                </p:cTn>
+                              </p:par>
+                            </p:childTnLst>
+                          </p:cTn>
+                        </p:par>
+                      </p:childTnLst>
+                    </p:cTn>
+                  </p:par>
+                </p:childTnLst>
+              </p:cTn>
+              <p:prevCondLst>
+                <p:cond evt="onPrev" delay="0">
+                  <p:tgtEl>
+                    <p:sldTgt/>
+                  </p:tgtEl>
+                </p:cond>
+              </p:prevCondLst>
+              <p:nextCondLst>
+                <p:cond evt="onNext" delay="0">
+                  <p:tgtEl>
+                    <p:sldTgt/>
+                  </p:tgtEl>
+                </p:cond>
+              </p:nextCondLst>
+            </p:seq>
+          </p:childTnLst>
+        </p:cTn>
+      </p:par>
+    </p:tnLst>
+  </p:timing>
+</p:sld>
+</file>
+
+<file path=ppt/slides/slide18.xml><?xml version="1.0" encoding="utf-8"?>
 <p:sld xmlns:a="http://schemas.openxmlformats.org/drawingml/2006/main" xmlns:r="http://schemas.openxmlformats.org/officeDocument/2006/relationships" xmlns:p="http://schemas.openxmlformats.org/presentationml/2006/main">
   <p:cSld>
     <p:spTree>
@@ -9867,30 +11440,21 @@
           <a:lstStyle/>
           <a:p>
             <a:r>
-              <a:rPr lang="en-US" altLang="en-US" sz="2800">
+              <a:rPr lang="en-US" altLang="en-US" sz="2800" dirty="0">
                 <a:ea typeface="ＭＳ Ｐゴシック" charset="-128"/>
               </a:rPr>
               <a:t>Few components</a:t>
             </a:r>
             <a:r>
-              <a:rPr lang="en-US" altLang="en-US" sz="2400">
+              <a:rPr lang="en-US" altLang="en-US" sz="2400" dirty="0">
                 <a:ea typeface="ＭＳ Ｐゴシック" charset="-128"/>
               </a:rPr>
               <a:t> with clear roles</a:t>
             </a:r>
           </a:p>
           <a:p>
-            <a:pPr lvl="1"/>
-            <a:r>
-              <a:rPr lang="en-US" altLang="en-US" sz="2400">
-                <a:ea typeface="ＭＳ Ｐゴシック" charset="-128"/>
-              </a:rPr>
-              <a:t>Use abstraction hierarchies</a:t>
-            </a:r>
-          </a:p>
-          <a:p>
-            <a:r>
-              <a:rPr lang="en-US" altLang="en-US" sz="2800">
+            <a:r>
+              <a:rPr lang="en-US" altLang="en-US" sz="2800" dirty="0">
                 <a:ea typeface="ＭＳ Ｐゴシック" charset="-128"/>
               </a:rPr>
               <a:t>Few interactions between components</a:t>
@@ -9899,7 +11463,7 @@
           <a:p>
             <a:pPr lvl="1"/>
             <a:r>
-              <a:rPr lang="en-US" altLang="en-US" sz="2400">
+              <a:rPr lang="en-US" altLang="en-US" sz="2400" dirty="0">
                 <a:ea typeface="ＭＳ Ｐゴシック" charset="-128"/>
               </a:rPr>
               <a:t>Carefully choose the features and interfaces</a:t>
@@ -9907,7 +11471,7 @@
           </a:p>
           <a:p>
             <a:r>
-              <a:rPr lang="en-US" altLang="en-US" sz="2800">
+              <a:rPr lang="en-US" altLang="en-US" sz="2800" dirty="0">
                 <a:ea typeface="ＭＳ Ｐゴシック" charset="-128"/>
               </a:rPr>
               <a:t>Similarity with other designs</a:t>
@@ -9916,7 +11480,7 @@
           <a:p>
             <a:pPr lvl="1"/>
             <a:r>
-              <a:rPr lang="en-US" altLang="en-US" sz="2400">
+              <a:rPr lang="en-US" altLang="en-US" sz="2400" dirty="0">
                 <a:ea typeface="ＭＳ Ｐゴシック" charset="-128"/>
               </a:rPr>
               <a:t>Use design patterns</a:t>
@@ -10243,15 +11807,33 @@
                                   </p:childTnLst>
                                 </p:cTn>
                               </p:par>
+                            </p:childTnLst>
+                          </p:cTn>
+                        </p:par>
+                      </p:childTnLst>
+                    </p:cTn>
+                  </p:par>
+                  <p:par>
+                    <p:cTn id="7" fill="hold" nodeType="clickPar">
+                      <p:stCondLst>
+                        <p:cond delay="indefinite"/>
+                      </p:stCondLst>
+                      <p:childTnLst>
+                        <p:par>
+                          <p:cTn id="8" fill="hold" nodeType="withGroup">
+                            <p:stCondLst>
+                              <p:cond delay="0"/>
+                            </p:stCondLst>
+                            <p:childTnLst>
                               <p:par>
-                                <p:cTn id="7" presetID="1" presetClass="entr" presetSubtype="0" fill="hold" nodeType="withEffect">
+                                <p:cTn id="9" presetID="1" presetClass="entr" presetSubtype="0" fill="hold" nodeType="clickEffect">
                                   <p:stCondLst>
                                     <p:cond delay="0"/>
                                   </p:stCondLst>
                                   <p:childTnLst>
                                     <p:set>
                                       <p:cBhvr>
-                                        <p:cTn id="8" dur="1" fill="hold">
+                                        <p:cTn id="10" dur="1" fill="hold">
                                           <p:stCondLst>
                                             <p:cond delay="0"/>
                                           </p:stCondLst>
@@ -10274,26 +11856,8 @@
                                   </p:childTnLst>
                                 </p:cTn>
                               </p:par>
-                            </p:childTnLst>
-                          </p:cTn>
-                        </p:par>
-                      </p:childTnLst>
-                    </p:cTn>
-                  </p:par>
-                  <p:par>
-                    <p:cTn id="9" fill="hold" nodeType="clickPar">
-                      <p:stCondLst>
-                        <p:cond delay="indefinite"/>
-                      </p:stCondLst>
-                      <p:childTnLst>
-                        <p:par>
-                          <p:cTn id="10" fill="hold" nodeType="withGroup">
-                            <p:stCondLst>
-                              <p:cond delay="0"/>
-                            </p:stCondLst>
-                            <p:childTnLst>
                               <p:par>
-                                <p:cTn id="11" presetID="1" presetClass="entr" presetSubtype="0" fill="hold" nodeType="clickEffect">
+                                <p:cTn id="11" presetID="1" presetClass="entr" presetSubtype="0" fill="hold" nodeType="withEffect">
                                   <p:stCondLst>
                                     <p:cond delay="0"/>
                                   </p:stCondLst>
@@ -10323,15 +11887,33 @@
                                   </p:childTnLst>
                                 </p:cTn>
                               </p:par>
+                            </p:childTnLst>
+                          </p:cTn>
+                        </p:par>
+                      </p:childTnLst>
+                    </p:cTn>
+                  </p:par>
+                  <p:par>
+                    <p:cTn id="13" fill="hold" nodeType="clickPar">
+                      <p:stCondLst>
+                        <p:cond delay="indefinite"/>
+                      </p:stCondLst>
+                      <p:childTnLst>
+                        <p:par>
+                          <p:cTn id="14" fill="hold" nodeType="withGroup">
+                            <p:stCondLst>
+                              <p:cond delay="0"/>
+                            </p:stCondLst>
+                            <p:childTnLst>
                               <p:par>
-                                <p:cTn id="13" presetID="1" presetClass="entr" presetSubtype="0" fill="hold" nodeType="withEffect">
+                                <p:cTn id="15" presetID="1" presetClass="entr" presetSubtype="0" fill="hold" nodeType="clickEffect">
                                   <p:stCondLst>
                                     <p:cond delay="0"/>
                                   </p:stCondLst>
                                   <p:childTnLst>
                                     <p:set>
                                       <p:cBhvr>
-                                        <p:cTn id="14" dur="1" fill="hold">
+                                        <p:cTn id="16" dur="1" fill="hold">
                                           <p:stCondLst>
                                             <p:cond delay="0"/>
                                           </p:stCondLst>
@@ -10354,26 +11936,8 @@
                                   </p:childTnLst>
                                 </p:cTn>
                               </p:par>
-                            </p:childTnLst>
-                          </p:cTn>
-                        </p:par>
-                      </p:childTnLst>
-                    </p:cTn>
-                  </p:par>
-                  <p:par>
-                    <p:cTn id="15" fill="hold" nodeType="clickPar">
-                      <p:stCondLst>
-                        <p:cond delay="indefinite"/>
-                      </p:stCondLst>
-                      <p:childTnLst>
-                        <p:par>
-                          <p:cTn id="16" fill="hold" nodeType="withGroup">
-                            <p:stCondLst>
-                              <p:cond delay="0"/>
-                            </p:stCondLst>
-                            <p:childTnLst>
                               <p:par>
-                                <p:cTn id="17" presetID="1" presetClass="entr" presetSubtype="0" fill="hold" nodeType="clickEffect">
+                                <p:cTn id="17" presetID="1" presetClass="entr" presetSubtype="0" fill="hold" nodeType="withEffect">
                                   <p:stCondLst>
                                     <p:cond delay="0"/>
                                   </p:stCondLst>
@@ -10389,37 +11953,6 @@
                                           <p:spTgt spid="7">
                                             <p:txEl>
                                               <p:pRg st="4" end="4"/>
-                                            </p:txEl>
-                                          </p:spTgt>
-                                        </p:tgtEl>
-                                        <p:attrNameLst>
-                                          <p:attrName>style.visibility</p:attrName>
-                                        </p:attrNameLst>
-                                      </p:cBhvr>
-                                      <p:to>
-                                        <p:strVal val="visible"/>
-                                      </p:to>
-                                    </p:set>
-                                  </p:childTnLst>
-                                </p:cTn>
-                              </p:par>
-                              <p:par>
-                                <p:cTn id="19" presetID="1" presetClass="entr" presetSubtype="0" fill="hold" nodeType="withEffect">
-                                  <p:stCondLst>
-                                    <p:cond delay="0"/>
-                                  </p:stCondLst>
-                                  <p:childTnLst>
-                                    <p:set>
-                                      <p:cBhvr>
-                                        <p:cTn id="20" dur="1" fill="hold">
-                                          <p:stCondLst>
-                                            <p:cond delay="0"/>
-                                          </p:stCondLst>
-                                        </p:cTn>
-                                        <p:tgtEl>
-                                          <p:spTgt spid="7">
-                                            <p:txEl>
-                                              <p:pRg st="5" end="5"/>
                                             </p:txEl>
                                           </p:spTgt>
                                         </p:tgtEl>

</xml_diff>